<commit_message>
Replacing read with a readline and updating powerpoint
</commit_message>
<xml_diff>
--- a/Queues and message based architecture.pptx
+++ b/Queues and message based architecture.pptx
@@ -26328,7 +26328,21 @@
           <a:p>
             <a:r>
               <a:rPr lang="en-US" dirty="0" smtClean="0"/>
-              <a:t>Not as fast as just calling methods</a:t>
+              <a:t>Not as fast as just calling </a:t>
+            </a:r>
+            <a:r>
+              <a:rPr lang="en-US" dirty="0" smtClean="0"/>
+              <a:t>methods</a:t>
+            </a:r>
+          </a:p>
+          <a:p>
+            <a:r>
+              <a:rPr lang="en-US" dirty="0" smtClean="0"/>
+              <a:t>Some queues allow </a:t>
+            </a:r>
+            <a:r>
+              <a:rPr lang="en-US" smtClean="0"/>
+              <a:t>for batching</a:t>
             </a:r>
             <a:endParaRPr lang="en-US" dirty="0"/>
           </a:p>
@@ -27782,11 +27796,7 @@
           <a:p>
             <a:r>
               <a:rPr lang="en-US" dirty="0" smtClean="0"/>
-              <a:t>Peek (not in all queues, try </a:t>
-            </a:r>
-            <a:r>
-              <a:rPr lang="en-US" smtClean="0"/>
-              <a:t>to avoid)</a:t>
+              <a:t>Peek (not in all queues, try to avoid)</a:t>
             </a:r>
             <a:endParaRPr lang="en-US" dirty="0"/>
           </a:p>

</xml_diff>